<commit_message>
DARPA PI meeting slides as presented
</commit_message>
<xml_diff>
--- a/presentations/verification-games-darpa-201307.pptx
+++ b/presentations/verification-games-darpa-201307.pptx
@@ -5,7 +5,7 @@
     <p:sldMasterId id="2147483648" r:id="rId1"/>
   </p:sldMasterIdLst>
   <p:notesMasterIdLst>
-    <p:notesMasterId r:id="rId29"/>
+    <p:notesMasterId r:id="rId30"/>
   </p:notesMasterIdLst>
   <p:sldIdLst>
     <p:sldId id="256" r:id="rId2"/>
@@ -34,7 +34,8 @@
     <p:sldId id="339" r:id="rId25"/>
     <p:sldId id="340" r:id="rId26"/>
     <p:sldId id="314" r:id="rId27"/>
-    <p:sldId id="306" r:id="rId28"/>
+    <p:sldId id="352" r:id="rId28"/>
+    <p:sldId id="306" r:id="rId29"/>
   </p:sldIdLst>
   <p:sldSz cx="9144000" cy="6858000" type="screen4x3"/>
   <p:notesSz cx="6858000" cy="9144000"/>
@@ -3769,11 +3770,6 @@
               </a:rPr>
               <a:t>2013</a:t>
             </a:r>
-            <a:endParaRPr lang="en-US" dirty="0" smtClean="0">
-              <a:solidFill>
-                <a:schemeClr val="tx1"/>
-              </a:solidFill>
-            </a:endParaRPr>
           </a:p>
           <a:p>
             <a:endParaRPr lang="en-US" dirty="0">
@@ -4301,7 +4297,6 @@
               <a:rPr lang="en-US" dirty="0"/>
               <a:t>inference and game solver</a:t>
             </a:r>
-            <a:endParaRPr lang="en-US" dirty="0"/>
           </a:p>
         </p:txBody>
       </p:sp>
@@ -4435,73 +4430,129 @@
             <p:ph idx="1"/>
           </p:nvPr>
         </p:nvSpPr>
-        <p:spPr/>
+        <p:spPr>
+          <a:xfrm>
+            <a:off x="457200" y="1371600"/>
+            <a:ext cx="8229600" cy="5715000"/>
+          </a:xfrm>
+        </p:spPr>
         <p:txBody>
           <a:bodyPr>
-            <a:normAutofit fontScale="77500" lnSpcReduction="20000"/>
+            <a:normAutofit fontScale="70000" lnSpcReduction="20000"/>
           </a:bodyPr>
           <a:lstStyle/>
           <a:p>
             <a:r>
-              <a:rPr lang="en-US" dirty="0" smtClean="0"/>
-              <a:t>Over a dozen type inference problems turned into games</a:t>
+              <a:rPr lang="en-US" smtClean="0"/>
+              <a:t>13 </a:t>
+            </a:r>
+            <a:r>
+              <a:rPr lang="en-US" dirty="0" smtClean="0"/>
+              <a:t>type inference problems </a:t>
+            </a:r>
+            <a:r>
+              <a:rPr lang="en-US" smtClean="0"/>
+              <a:t>turned </a:t>
+            </a:r>
+            <a:r>
+              <a:rPr lang="en-US" smtClean="0"/>
+              <a:t>into a game</a:t>
             </a:r>
             <a:endParaRPr lang="en-US" dirty="0"/>
           </a:p>
           <a:p>
             <a:pPr lvl="1"/>
             <a:r>
-              <a:rPr lang="en-US" dirty="0" smtClean="0"/>
-              <a:t>OSTrusted</a:t>
+              <a:rPr lang="en-US" dirty="0"/>
+              <a:t>download</a:t>
             </a:r>
           </a:p>
           <a:p>
             <a:pPr lvl="1"/>
             <a:r>
-              <a:rPr lang="en-US" dirty="0" smtClean="0"/>
-              <a:t>Hardcoded</a:t>
+              <a:rPr lang="en-US" dirty="0"/>
+              <a:t>encoding</a:t>
             </a:r>
           </a:p>
           <a:p>
             <a:pPr lvl="1"/>
             <a:r>
-              <a:rPr lang="en-US" dirty="0" smtClean="0"/>
-              <a:t>Random</a:t>
+              <a:rPr lang="en-US" dirty="0"/>
+              <a:t>encrypted</a:t>
             </a:r>
           </a:p>
           <a:p>
             <a:pPr lvl="1"/>
             <a:r>
-              <a:rPr lang="en-US" dirty="0" smtClean="0"/>
-              <a:t>Encrypted</a:t>
-            </a:r>
+              <a:rPr lang="en-US" dirty="0" err="1"/>
+              <a:t>filetype</a:t>
+            </a:r>
+            <a:endParaRPr lang="en-US" dirty="0"/>
           </a:p>
           <a:p>
             <a:pPr lvl="1"/>
             <a:r>
-              <a:rPr lang="en-US" dirty="0" smtClean="0"/>
-              <a:t>SafeFileType</a:t>
+              <a:rPr lang="en-US" dirty="0"/>
+              <a:t>hardcoded</a:t>
             </a:r>
           </a:p>
           <a:p>
             <a:pPr lvl="1"/>
             <a:r>
-              <a:rPr lang="en-US" dirty="0" smtClean="0"/>
-              <a:t>OneWayHashWithSalt</a:t>
+              <a:rPr lang="en-US" dirty="0"/>
+              <a:t>internal</a:t>
             </a:r>
           </a:p>
           <a:p>
             <a:pPr lvl="1"/>
             <a:r>
-              <a:rPr lang="en-US" dirty="0" smtClean="0"/>
-              <a:t>Lock</a:t>
+              <a:rPr lang="en-US" dirty="0"/>
+              <a:t>lock</a:t>
             </a:r>
           </a:p>
           <a:p>
             <a:pPr lvl="1"/>
             <a:r>
-              <a:rPr lang="en-US" dirty="0" smtClean="0"/>
-              <a:t>...</a:t>
+              <a:rPr lang="en-US" dirty="0" err="1"/>
+              <a:t>nninf</a:t>
+            </a:r>
+            <a:endParaRPr lang="en-US" dirty="0"/>
+          </a:p>
+          <a:p>
+            <a:pPr lvl="1"/>
+            <a:r>
+              <a:rPr lang="en-US" dirty="0" err="1"/>
+              <a:t>ostrusted</a:t>
+            </a:r>
+            <a:endParaRPr lang="en-US" dirty="0"/>
+          </a:p>
+          <a:p>
+            <a:pPr lvl="1"/>
+            <a:r>
+              <a:rPr lang="en-US" dirty="0"/>
+              <a:t>random</a:t>
+            </a:r>
+          </a:p>
+          <a:p>
+            <a:pPr lvl="1"/>
+            <a:r>
+              <a:rPr lang="en-US" dirty="0"/>
+              <a:t>salt</a:t>
+            </a:r>
+          </a:p>
+          <a:p>
+            <a:pPr lvl="1"/>
+            <a:r>
+              <a:rPr lang="en-US" dirty="0" err="1"/>
+              <a:t>sqltrusted</a:t>
+            </a:r>
+            <a:endParaRPr lang="en-US" dirty="0"/>
+          </a:p>
+          <a:p>
+            <a:pPr lvl="1"/>
+            <a:r>
+              <a:rPr lang="en-US" dirty="0" smtClean="0"/>
+              <a:t>trusted</a:t>
             </a:r>
             <a:endParaRPr lang="en-US" dirty="0"/>
           </a:p>
@@ -6128,28 +6179,80 @@
         <p:spPr/>
         <p:txBody>
           <a:bodyPr>
-            <a:normAutofit fontScale="85000" lnSpcReduction="20000"/>
+            <a:normAutofit fontScale="77500" lnSpcReduction="20000"/>
           </a:bodyPr>
           <a:lstStyle/>
           <a:p>
+            <a:pPr marL="0" indent="0">
+              <a:buNone/>
+            </a:pPr>
             <a:r>
               <a:rPr lang="en-US" dirty="0"/>
-              <a:t>Two implementations:  testbed and deployment.</a:t>
-            </a:r>
-          </a:p>
-          <a:p>
+              <a:t>Two </a:t>
+            </a:r>
+            <a:r>
+              <a:rPr lang="en-US" dirty="0" smtClean="0"/>
+              <a:t>implementations:</a:t>
+            </a:r>
+            <a:endParaRPr lang="en-US" dirty="0"/>
+          </a:p>
+          <a:p>
+            <a:r>
+              <a:rPr lang="en-US" dirty="0" smtClean="0"/>
+              <a:t>Deployment </a:t>
+            </a:r>
+          </a:p>
+          <a:p>
+            <a:pPr lvl="1"/>
+            <a:r>
+              <a:rPr lang="en-US" dirty="0" smtClean="0"/>
+              <a:t>A </a:t>
+            </a:r>
             <a:r>
               <a:rPr lang="en-US" dirty="0"/>
-              <a:t>Automation of common operations:  push conflicts up or down</a:t>
-            </a:r>
-          </a:p>
-          <a:p>
+              <a:t>few features remain to be implemented </a:t>
+            </a:r>
+            <a:r>
+              <a:rPr lang="en-US" dirty="0" smtClean="0"/>
+              <a:t>(if, maps</a:t>
+            </a:r>
             <a:r>
               <a:rPr lang="en-US" dirty="0"/>
-              <a:t>A few features remain to be implemented (maps, generics).</a:t>
-            </a:r>
-          </a:p>
-          <a:p>
+              <a:t>, generics</a:t>
+            </a:r>
+            <a:r>
+              <a:rPr lang="en-US" dirty="0" smtClean="0"/>
+              <a:t>)</a:t>
+            </a:r>
+          </a:p>
+          <a:p>
+            <a:r>
+              <a:rPr lang="en-US" dirty="0" smtClean="0"/>
+              <a:t>Testbed</a:t>
+            </a:r>
+          </a:p>
+          <a:p>
+            <a:pPr lvl="1"/>
+            <a:r>
+              <a:rPr lang="en-US" dirty="0" smtClean="0"/>
+              <a:t>Fully-featured</a:t>
+            </a:r>
+          </a:p>
+          <a:p>
+            <a:pPr lvl="1"/>
+            <a:r>
+              <a:rPr lang="en-US" dirty="0" smtClean="0"/>
+              <a:t>Automation </a:t>
+            </a:r>
+            <a:r>
+              <a:rPr lang="en-US" dirty="0"/>
+              <a:t>of common operations:  push conflicts up or down</a:t>
+            </a:r>
+          </a:p>
+          <a:p>
+            <a:pPr marL="0" indent="0">
+              <a:buNone/>
+            </a:pPr>
             <a:endParaRPr lang="en-US" dirty="0" smtClean="0"/>
           </a:p>
           <a:p>
@@ -6271,11 +6374,7 @@
           <a:p>
             <a:r>
               <a:rPr lang="en-US" dirty="0" smtClean="0"/>
-              <a:t>Hard problems in </a:t>
-            </a:r>
-            <a:r>
-              <a:rPr lang="en-US" dirty="0" smtClean="0"/>
-              <a:t>software verification</a:t>
+              <a:t>Hard problems in software verification</a:t>
             </a:r>
             <a:endParaRPr lang="en-US" dirty="0"/>
           </a:p>
@@ -6399,13 +6498,8 @@
           <a:p>
             <a:r>
               <a:rPr lang="en-US" dirty="0" smtClean="0"/>
-              <a:t>Making </a:t>
-            </a:r>
-            <a:r>
-              <a:rPr lang="en-US" dirty="0" smtClean="0"/>
-              <a:t>verification fun</a:t>
-            </a:r>
-            <a:endParaRPr lang="en-US" dirty="0" smtClean="0"/>
+              <a:t>Making verification fun</a:t>
+            </a:r>
           </a:p>
           <a:p>
             <a:endParaRPr lang="en-US" dirty="0"/>
@@ -6416,19 +6510,11 @@
             </a:pPr>
             <a:r>
               <a:rPr lang="en-US" dirty="0" err="1" smtClean="0"/>
-              <a:t>Games</a:t>
-            </a:r>
-            <a:r>
-              <a:rPr lang="en-US" dirty="0" err="1" smtClean="0"/>
-              <a:t>↔verification</a:t>
-            </a:r>
-            <a:r>
-              <a:rPr lang="en-US" dirty="0" smtClean="0"/>
-              <a:t>:  </a:t>
-            </a:r>
-            <a:r>
-              <a:rPr lang="en-US" dirty="0" smtClean="0"/>
-              <a:t>A useful, if imperfect, analogy</a:t>
+              <a:t>Games↔verification</a:t>
+            </a:r>
+            <a:r>
+              <a:rPr lang="en-US" dirty="0" smtClean="0"/>
+              <a:t>:  A useful, if imperfect, analogy</a:t>
             </a:r>
           </a:p>
           <a:p>
@@ -6460,11 +6546,7 @@
             </a:r>
             <a:r>
               <a:rPr lang="en-US" smtClean="0"/>
-              <a:t>verification</a:t>
-            </a:r>
-            <a:r>
-              <a:rPr lang="en-US" smtClean="0"/>
-              <a:t> </a:t>
+              <a:t>verification </a:t>
             </a:r>
             <a:r>
               <a:rPr lang="en-US" dirty="0"/>
@@ -6568,7 +6650,7 @@
         </p:spPr>
         <p:txBody>
           <a:bodyPr>
-            <a:normAutofit fontScale="55000" lnSpcReduction="20000"/>
+            <a:normAutofit/>
           </a:bodyPr>
           <a:lstStyle/>
           <a:p>
@@ -6630,118 +6712,6 @@
               <a:rPr lang="en-US" dirty="0" smtClean="0"/>
               <a:t>NYU/Google</a:t>
             </a:r>
-          </a:p>
-          <a:p>
-            <a:endParaRPr lang="en-US" dirty="0"/>
-          </a:p>
-          <a:p>
-            <a:pPr marL="0" indent="0">
-              <a:buNone/>
-            </a:pPr>
-            <a:r>
-              <a:rPr lang="en-US" dirty="0" smtClean="0"/>
-              <a:t>Publications</a:t>
-            </a:r>
-            <a:endParaRPr lang="en-US" dirty="0"/>
-          </a:p>
-          <a:p>
-            <a:r>
-              <a:rPr lang="en-US" dirty="0" smtClean="0"/>
-              <a:t>JavaUI</a:t>
-            </a:r>
-            <a:r>
-              <a:rPr lang="en-US" dirty="0"/>
-              <a:t>: Effects for Controlling UI Object </a:t>
-            </a:r>
-            <a:r>
-              <a:rPr lang="en-US" dirty="0" smtClean="0"/>
-              <a:t>Access</a:t>
-            </a:r>
-            <a:r>
-              <a:rPr lang="en-US" dirty="0"/>
-              <a:t/>
-            </a:r>
-            <a:br>
-              <a:rPr lang="en-US" dirty="0"/>
-            </a:br>
-            <a:r>
-              <a:rPr lang="en-US" dirty="0" smtClean="0"/>
-              <a:t>by </a:t>
-            </a:r>
-            <a:r>
-              <a:rPr lang="en-US" dirty="0"/>
-              <a:t>Colin S. Gordon, Werner Dietl, Michael D. Ernst, and Dan </a:t>
-            </a:r>
-            <a:r>
-              <a:rPr lang="en-US" dirty="0" smtClean="0"/>
-              <a:t>Grossman.</a:t>
-            </a:r>
-            <a:br>
-              <a:rPr lang="en-US" dirty="0" smtClean="0"/>
-            </a:br>
-            <a:r>
-              <a:rPr lang="en-US" dirty="0" smtClean="0"/>
-              <a:t>In </a:t>
-            </a:r>
-            <a:r>
-              <a:rPr lang="en-US" dirty="0"/>
-              <a:t>ECOOP 2013 </a:t>
-            </a:r>
-            <a:r>
-              <a:rPr lang="en-US" dirty="0" smtClean="0"/>
-              <a:t>- </a:t>
-            </a:r>
-            <a:r>
-              <a:rPr lang="en-US" dirty="0"/>
-              <a:t>Object-Oriented Programming, 27th European Conference, (Montpellier, France), July 3-5, 2013</a:t>
-            </a:r>
-            <a:r>
-              <a:rPr lang="en-US" dirty="0" smtClean="0"/>
-              <a:t>.</a:t>
-            </a:r>
-            <a:endParaRPr lang="en-US" dirty="0"/>
-          </a:p>
-          <a:p>
-            <a:r>
-              <a:rPr lang="en-US" dirty="0" smtClean="0"/>
-              <a:t>Rely-Guarantee </a:t>
-            </a:r>
-            <a:r>
-              <a:rPr lang="en-US" dirty="0"/>
-              <a:t>References for Refinement Types Over Aliased Mutable </a:t>
-            </a:r>
-            <a:r>
-              <a:rPr lang="en-US" dirty="0" smtClean="0"/>
-              <a:t>Data</a:t>
-            </a:r>
-            <a:br>
-              <a:rPr lang="en-US" dirty="0" smtClean="0"/>
-            </a:br>
-            <a:r>
-              <a:rPr lang="en-US" dirty="0" smtClean="0"/>
-              <a:t>by </a:t>
-            </a:r>
-            <a:r>
-              <a:rPr lang="en-US" dirty="0"/>
-              <a:t>Colin S. Gordon, Michael D. Ernst, and Dan </a:t>
-            </a:r>
-            <a:r>
-              <a:rPr lang="en-US" dirty="0" smtClean="0"/>
-              <a:t>Grossman.</a:t>
-            </a:r>
-            <a:br>
-              <a:rPr lang="en-US" dirty="0" smtClean="0"/>
-            </a:br>
-            <a:r>
-              <a:rPr lang="en-US" dirty="0" smtClean="0"/>
-              <a:t>In </a:t>
-            </a:r>
-            <a:r>
-              <a:rPr lang="en-US" dirty="0"/>
-              <a:t>PLDI 2013, Proceedings of the ACM SIGPLAN 2013 Conference on Programming Language Design and Implementation, (Seattle, WA, USA), June 17-19, 2013.</a:t>
-            </a:r>
-          </a:p>
-          <a:p>
             <a:endParaRPr lang="en-US" dirty="0"/>
           </a:p>
           <a:p>
@@ -6789,16 +6759,567 @@
           <a:chExt cx="0" cy="0"/>
         </a:xfrm>
       </p:grpSpPr>
+      <p:sp>
+        <p:nvSpPr>
+          <p:cNvPr id="2" name="Title 1"/>
+          <p:cNvSpPr>
+            <a:spLocks noGrp="1"/>
+          </p:cNvSpPr>
+          <p:nvPr>
+            <p:ph type="title"/>
+          </p:nvPr>
+        </p:nvSpPr>
+        <p:spPr/>
+        <p:txBody>
+          <a:bodyPr/>
+          <a:lstStyle/>
+          <a:p>
+            <a:r>
+              <a:rPr lang="en-US" dirty="0" smtClean="0"/>
+              <a:t>Publications</a:t>
+            </a:r>
+            <a:endParaRPr lang="en-US" dirty="0"/>
+          </a:p>
+        </p:txBody>
+      </p:sp>
+      <p:sp>
+        <p:nvSpPr>
+          <p:cNvPr id="3" name="Content Placeholder 2"/>
+          <p:cNvSpPr>
+            <a:spLocks noGrp="1"/>
+          </p:cNvSpPr>
+          <p:nvPr>
+            <p:ph idx="1"/>
+          </p:nvPr>
+        </p:nvSpPr>
+        <p:spPr>
+          <a:xfrm>
+            <a:off x="457200" y="1600200"/>
+            <a:ext cx="8229600" cy="4953000"/>
+          </a:xfrm>
+        </p:spPr>
+        <p:txBody>
+          <a:bodyPr>
+            <a:normAutofit fontScale="47500" lnSpcReduction="20000"/>
+          </a:bodyPr>
+          <a:lstStyle/>
+          <a:p>
+            <a:r>
+              <a:rPr lang="en-US" dirty="0" err="1"/>
+              <a:t>JavaUI</a:t>
+            </a:r>
+            <a:r>
+              <a:rPr lang="en-US" dirty="0"/>
+              <a:t>: Effects for Controlling UI Object Access</a:t>
+            </a:r>
+            <a:br>
+              <a:rPr lang="en-US" dirty="0"/>
+            </a:br>
+            <a:r>
+              <a:rPr lang="en-US" dirty="0"/>
+              <a:t>by Colin S. Gordon, Werner </a:t>
+            </a:r>
+            <a:r>
+              <a:rPr lang="en-US" dirty="0" err="1"/>
+              <a:t>Dietl</a:t>
+            </a:r>
+            <a:r>
+              <a:rPr lang="en-US" dirty="0"/>
+              <a:t>, Michael D. Ernst, and Dan Grossman.</a:t>
+            </a:r>
+            <a:br>
+              <a:rPr lang="en-US" dirty="0"/>
+            </a:br>
+            <a:r>
+              <a:rPr lang="en-US" dirty="0"/>
+              <a:t>In ECOOP 2013 - Object-Oriented Programming, 27th European Conference, (Montpellier, France), July 3-5, 2013.</a:t>
+            </a:r>
+          </a:p>
+          <a:p>
+            <a:r>
+              <a:rPr lang="en-US" dirty="0"/>
+              <a:t>Rely-Guarantee References for Refinement Types Over Aliased Mutable Data</a:t>
+            </a:r>
+            <a:br>
+              <a:rPr lang="en-US" dirty="0"/>
+            </a:br>
+            <a:r>
+              <a:rPr lang="en-US" dirty="0"/>
+              <a:t>by Colin S. Gordon, Michael D. Ernst, and Dan Grossman.</a:t>
+            </a:r>
+            <a:br>
+              <a:rPr lang="en-US" dirty="0"/>
+            </a:br>
+            <a:r>
+              <a:rPr lang="en-US" dirty="0"/>
+              <a:t>In PLDI 2013, Proceedings of the ACM SIGPLAN 2013 Conference on Programming Language Design and Implementation, (Seattle, WA, USA), June 17-19, 2013.</a:t>
+            </a:r>
+          </a:p>
+          <a:p>
+            <a:r>
+              <a:rPr lang="en-US" dirty="0" smtClean="0"/>
+              <a:t>"</a:t>
+            </a:r>
+            <a:r>
+              <a:rPr lang="en-US" dirty="0"/>
+              <a:t>Quantifying over Play: Constraining Undesirable Solutions in Puzzle </a:t>
+            </a:r>
+            <a:r>
+              <a:rPr lang="en-US" dirty="0" smtClean="0"/>
+              <a:t>Design“</a:t>
+            </a:r>
+            <a:br>
+              <a:rPr lang="en-US" dirty="0" smtClean="0"/>
+            </a:br>
+            <a:r>
+              <a:rPr lang="en-US" dirty="0" smtClean="0"/>
+              <a:t>Adam </a:t>
+            </a:r>
+            <a:r>
+              <a:rPr lang="en-US" dirty="0"/>
+              <a:t>M. Smith, Eric Butler, and </a:t>
+            </a:r>
+            <a:r>
+              <a:rPr lang="en-US" dirty="0" err="1"/>
+              <a:t>Zoran</a:t>
+            </a:r>
+            <a:r>
+              <a:rPr lang="en-US" dirty="0"/>
+              <a:t> </a:t>
+            </a:r>
+            <a:r>
+              <a:rPr lang="en-US" dirty="0" err="1"/>
+              <a:t>Popovic</a:t>
+            </a:r>
+            <a:r>
+              <a:rPr lang="en-US" dirty="0"/>
+              <a:t>. Foundations of Digital Games (FDG), 2013</a:t>
+            </a:r>
+          </a:p>
+          <a:p>
+            <a:r>
+              <a:rPr lang="en-US" dirty="0" smtClean="0"/>
+              <a:t>"</a:t>
+            </a:r>
+            <a:r>
+              <a:rPr lang="en-US" dirty="0"/>
+              <a:t>Automatic Redesign of Local </a:t>
+            </a:r>
+            <a:r>
+              <a:rPr lang="en-US" dirty="0" err="1"/>
+              <a:t>Playspace</a:t>
+            </a:r>
+            <a:r>
+              <a:rPr lang="en-US" dirty="0"/>
+              <a:t> </a:t>
+            </a:r>
+            <a:r>
+              <a:rPr lang="en-US" dirty="0" smtClean="0"/>
+              <a:t>Properties“</a:t>
+            </a:r>
+            <a:br>
+              <a:rPr lang="en-US" dirty="0" smtClean="0"/>
+            </a:br>
+            <a:r>
+              <a:rPr lang="en-US" dirty="0" smtClean="0"/>
+              <a:t>Aaron </a:t>
+            </a:r>
+            <a:r>
+              <a:rPr lang="en-US" dirty="0"/>
+              <a:t>Bauer, Seth Cooper, and </a:t>
+            </a:r>
+            <a:r>
+              <a:rPr lang="en-US" dirty="0" err="1"/>
+              <a:t>Zoran</a:t>
+            </a:r>
+            <a:r>
+              <a:rPr lang="en-US" dirty="0"/>
+              <a:t> </a:t>
+            </a:r>
+            <a:r>
+              <a:rPr lang="en-US" dirty="0" err="1"/>
+              <a:t>Popovic</a:t>
+            </a:r>
+            <a:r>
+              <a:rPr lang="en-US" dirty="0"/>
+              <a:t>. Foundations of Digital Games (FDG), 2013</a:t>
+            </a:r>
+          </a:p>
+          <a:p>
+            <a:r>
+              <a:rPr lang="en-US" dirty="0" smtClean="0"/>
+              <a:t>"</a:t>
+            </a:r>
+            <a:r>
+              <a:rPr lang="en-US" dirty="0"/>
+              <a:t>Predicting Player Moves in an Educational Game: A Hybrid </a:t>
+            </a:r>
+            <a:r>
+              <a:rPr lang="en-US" dirty="0" smtClean="0"/>
+              <a:t>Approach“</a:t>
+            </a:r>
+            <a:br>
+              <a:rPr lang="en-US" dirty="0" smtClean="0"/>
+            </a:br>
+            <a:r>
+              <a:rPr lang="en-US" dirty="0" smtClean="0"/>
+              <a:t>Yun-En </a:t>
+            </a:r>
+            <a:r>
+              <a:rPr lang="en-US" dirty="0"/>
+              <a:t>Liu, Travis Mandel, Eric Butler, Erik Andersen, Eleanor O’Rourke, Emma </a:t>
+            </a:r>
+            <a:r>
+              <a:rPr lang="en-US" dirty="0" err="1"/>
+              <a:t>Brunskill</a:t>
+            </a:r>
+            <a:r>
+              <a:rPr lang="en-US" dirty="0"/>
+              <a:t>, and </a:t>
+            </a:r>
+            <a:r>
+              <a:rPr lang="en-US" dirty="0" err="1"/>
+              <a:t>Zoran</a:t>
+            </a:r>
+            <a:r>
+              <a:rPr lang="en-US" dirty="0"/>
+              <a:t> </a:t>
+            </a:r>
+            <a:r>
+              <a:rPr lang="en-US" dirty="0" err="1"/>
+              <a:t>Popovic</a:t>
+            </a:r>
+            <a:r>
+              <a:rPr lang="en-US" dirty="0"/>
+              <a:t>. Educational Data Mining (EDM), 2013</a:t>
+            </a:r>
+          </a:p>
+          <a:p>
+            <a:r>
+              <a:rPr lang="en-US" dirty="0" smtClean="0"/>
+              <a:t>"</a:t>
+            </a:r>
+            <a:r>
+              <a:rPr lang="en-US" dirty="0"/>
+              <a:t>Evaluating Competitive Game Balance with Restricted </a:t>
+            </a:r>
+            <a:r>
+              <a:rPr lang="en-US" dirty="0" smtClean="0"/>
+              <a:t>Play“</a:t>
+            </a:r>
+            <a:br>
+              <a:rPr lang="en-US" dirty="0" smtClean="0"/>
+            </a:br>
+            <a:r>
+              <a:rPr lang="en-US" dirty="0" smtClean="0"/>
+              <a:t>Alexander </a:t>
+            </a:r>
+            <a:r>
+              <a:rPr lang="en-US" dirty="0"/>
+              <a:t>Jaffe, Alex Miller, Erik Andersen, Yun-En Liu, Anna </a:t>
+            </a:r>
+            <a:r>
+              <a:rPr lang="en-US" dirty="0" err="1"/>
+              <a:t>Karlin</a:t>
+            </a:r>
+            <a:r>
+              <a:rPr lang="en-US" dirty="0"/>
+              <a:t>, and </a:t>
+            </a:r>
+            <a:r>
+              <a:rPr lang="en-US" dirty="0" err="1"/>
+              <a:t>Zoran</a:t>
+            </a:r>
+            <a:r>
+              <a:rPr lang="en-US" dirty="0"/>
+              <a:t> </a:t>
+            </a:r>
+            <a:r>
+              <a:rPr lang="en-US" dirty="0" err="1"/>
+              <a:t>Popovic</a:t>
+            </a:r>
+            <a:r>
+              <a:rPr lang="en-US" dirty="0"/>
+              <a:t>. In Artificial Intelligence and Interactive Digital Entertainment (AIIDE 2012), (Palo Alto, CA), October 8-12, 2012.</a:t>
+            </a:r>
+          </a:p>
+          <a:p>
+            <a:r>
+              <a:rPr lang="en-US" dirty="0" smtClean="0"/>
+              <a:t>"</a:t>
+            </a:r>
+            <a:r>
+              <a:rPr lang="en-US" dirty="0"/>
+              <a:t>RRT-Based Game Level Analysis, Visualization, and Visual </a:t>
+            </a:r>
+            <a:r>
+              <a:rPr lang="en-US" dirty="0" smtClean="0"/>
+              <a:t>Refinement“</a:t>
+            </a:r>
+            <a:br>
+              <a:rPr lang="en-US" dirty="0" smtClean="0"/>
+            </a:br>
+            <a:r>
+              <a:rPr lang="en-US" dirty="0" smtClean="0"/>
+              <a:t>Aaron </a:t>
+            </a:r>
+            <a:r>
+              <a:rPr lang="en-US" dirty="0"/>
+              <a:t>William Bauer and </a:t>
+            </a:r>
+            <a:r>
+              <a:rPr lang="en-US" dirty="0" err="1"/>
+              <a:t>Zoran</a:t>
+            </a:r>
+            <a:r>
+              <a:rPr lang="en-US" dirty="0"/>
+              <a:t> </a:t>
+            </a:r>
+            <a:r>
+              <a:rPr lang="en-US" dirty="0" err="1"/>
+              <a:t>Popovic</a:t>
+            </a:r>
+            <a:r>
+              <a:rPr lang="en-US" dirty="0"/>
+              <a:t>. In Artificial Intelligence and Interactive Digital Entertainment (AIIDE 2012), (Palo Alto, CA), October 8-12, 2012.</a:t>
+            </a:r>
+          </a:p>
+          <a:p>
+            <a:r>
+              <a:rPr lang="en-US" dirty="0" smtClean="0"/>
+              <a:t>"</a:t>
+            </a:r>
+            <a:r>
+              <a:rPr lang="en-US" dirty="0"/>
+              <a:t>A Trace-based Framework for Analyzing and Synthesizing Educational </a:t>
+            </a:r>
+            <a:r>
+              <a:rPr lang="en-US" dirty="0" smtClean="0"/>
+              <a:t>Progressions“</a:t>
+            </a:r>
+            <a:br>
+              <a:rPr lang="en-US" dirty="0" smtClean="0"/>
+            </a:br>
+            <a:r>
+              <a:rPr lang="en-US" dirty="0" smtClean="0"/>
+              <a:t>Erik </a:t>
+            </a:r>
+            <a:r>
+              <a:rPr lang="en-US" dirty="0"/>
+              <a:t>Andersen, </a:t>
+            </a:r>
+            <a:r>
+              <a:rPr lang="en-US" dirty="0" err="1"/>
+              <a:t>Sumit</a:t>
+            </a:r>
+            <a:r>
+              <a:rPr lang="en-US" dirty="0"/>
+              <a:t> </a:t>
+            </a:r>
+            <a:r>
+              <a:rPr lang="en-US" dirty="0" err="1"/>
+              <a:t>Gulwani</a:t>
+            </a:r>
+            <a:r>
+              <a:rPr lang="en-US" dirty="0"/>
+              <a:t>, and </a:t>
+            </a:r>
+            <a:r>
+              <a:rPr lang="en-US" dirty="0" err="1"/>
+              <a:t>Zoran</a:t>
+            </a:r>
+            <a:r>
+              <a:rPr lang="en-US" dirty="0"/>
+              <a:t> </a:t>
+            </a:r>
+            <a:r>
+              <a:rPr lang="en-US" dirty="0" err="1"/>
+              <a:t>Popovic</a:t>
+            </a:r>
+            <a:r>
+              <a:rPr lang="en-US" dirty="0"/>
+              <a:t>. CHI 2013 (Paris, France), April 27 - May 2, 2013.</a:t>
+            </a:r>
+          </a:p>
+          <a:p>
+            <a:endParaRPr lang="en-US" dirty="0"/>
+          </a:p>
+          <a:p>
+            <a:endParaRPr lang="en-US" dirty="0"/>
+          </a:p>
+        </p:txBody>
+      </p:sp>
+    </p:spTree>
+    <p:extLst>
+      <p:ext uri="{BB962C8B-B14F-4D97-AF65-F5344CB8AC3E}">
+        <p14:creationId xmlns:p14="http://schemas.microsoft.com/office/powerpoint/2010/main" val="3600927057"/>
+      </p:ext>
+    </p:extLst>
+  </p:cSld>
+  <p:clrMapOvr>
+    <a:masterClrMapping/>
+  </p:clrMapOvr>
+  <p:timing>
+    <p:tnLst>
+      <p:par>
+        <p:cTn id="1" dur="indefinite" restart="never" nodeType="tmRoot"/>
+      </p:par>
+    </p:tnLst>
+  </p:timing>
+</p:sld>
+</file>
+
+<file path=ppt/slides/slide28.xml><?xml version="1.0" encoding="utf-8"?>
+<p:sld xmlns:a="http://schemas.openxmlformats.org/drawingml/2006/main" xmlns:r="http://schemas.openxmlformats.org/officeDocument/2006/relationships" xmlns:p="http://schemas.openxmlformats.org/presentationml/2006/main">
+  <p:cSld>
+    <p:spTree>
+      <p:nvGrpSpPr>
+        <p:cNvPr id="1" name=""/>
+        <p:cNvGrpSpPr/>
+        <p:nvPr/>
+      </p:nvGrpSpPr>
+      <p:grpSpPr>
+        <a:xfrm>
+          <a:off x="0" y="0"/>
+          <a:ext cx="0" cy="0"/>
+          <a:chOff x="0" y="0"/>
+          <a:chExt cx="0" cy="0"/>
+        </a:xfrm>
+      </p:grpSpPr>
+      <p:sp>
+        <p:nvSpPr>
+          <p:cNvPr id="2" name="Title 1"/>
+          <p:cNvSpPr>
+            <a:spLocks noGrp="1"/>
+          </p:cNvSpPr>
+          <p:nvPr>
+            <p:ph type="title"/>
+          </p:nvPr>
+        </p:nvSpPr>
+        <p:spPr/>
+        <p:txBody>
+          <a:bodyPr>
+            <a:noAutofit/>
+          </a:bodyPr>
+          <a:lstStyle/>
+          <a:p>
+            <a:r>
+              <a:rPr lang="en-US" dirty="0" smtClean="0"/>
+              <a:t>Verification</a:t>
+            </a:r>
+            <a:br>
+              <a:rPr lang="en-US" dirty="0" smtClean="0"/>
+            </a:br>
+            <a:r>
+              <a:rPr lang="en-US" dirty="0" smtClean="0"/>
+              <a:t>Games</a:t>
+            </a:r>
+            <a:endParaRPr lang="en-US" dirty="0"/>
+          </a:p>
+        </p:txBody>
+      </p:sp>
+      <p:sp>
+        <p:nvSpPr>
+          <p:cNvPr id="3" name="Content Placeholder 2"/>
+          <p:cNvSpPr>
+            <a:spLocks noGrp="1"/>
+          </p:cNvSpPr>
+          <p:nvPr>
+            <p:ph idx="1"/>
+          </p:nvPr>
+        </p:nvSpPr>
+        <p:spPr>
+          <a:xfrm>
+            <a:off x="457200" y="1951037"/>
+            <a:ext cx="8305800" cy="4525963"/>
+          </a:xfrm>
+        </p:spPr>
+        <p:txBody>
+          <a:bodyPr>
+            <a:normAutofit fontScale="92500" lnSpcReduction="20000"/>
+          </a:bodyPr>
+          <a:lstStyle/>
+          <a:p>
+            <a:endParaRPr lang="en-US" dirty="0" smtClean="0"/>
+          </a:p>
+          <a:p>
+            <a:r>
+              <a:rPr lang="en-US" dirty="0" smtClean="0"/>
+              <a:t>Gamification of program verification</a:t>
+            </a:r>
+          </a:p>
+          <a:p>
+            <a:r>
+              <a:rPr lang="en-US" dirty="0" smtClean="0"/>
+              <a:t>Game corresponds to correctness condition</a:t>
+            </a:r>
+          </a:p>
+          <a:p>
+            <a:r>
+              <a:rPr lang="en-US" dirty="0" smtClean="0"/>
+              <a:t>Game utilizes physical intuition</a:t>
+            </a:r>
+          </a:p>
+          <a:p>
+            <a:r>
+              <a:rPr lang="en-US" dirty="0" smtClean="0"/>
+              <a:t>Game is playable by anyone</a:t>
+            </a:r>
+          </a:p>
+          <a:p>
+            <a:r>
+              <a:rPr lang="en-US" dirty="0" smtClean="0"/>
+              <a:t>Game allows application of human insight</a:t>
+            </a:r>
+          </a:p>
+          <a:p>
+            <a:r>
+              <a:rPr lang="en-US" dirty="0" smtClean="0"/>
+              <a:t>Goal:  cheaper verification </a:t>
+            </a:r>
+            <a:r>
+              <a:rPr lang="en-US" dirty="0" smtClean="0">
+                <a:sym typeface="Symbol"/>
+              </a:rPr>
+              <a:t> </a:t>
+            </a:r>
+            <a:r>
+              <a:rPr lang="en-US" dirty="0" smtClean="0"/>
+              <a:t>more verification</a:t>
+            </a:r>
+          </a:p>
+          <a:p>
+            <a:endParaRPr lang="en-US" dirty="0" smtClean="0"/>
+          </a:p>
+          <a:p>
+            <a:pPr marL="0" indent="0" algn="ctr">
+              <a:buNone/>
+            </a:pPr>
+            <a:r>
+              <a:rPr lang="en-US" dirty="0" smtClean="0"/>
+              <a:t>http</a:t>
+            </a:r>
+            <a:r>
+              <a:rPr lang="en-US" dirty="0"/>
+              <a:t>://</a:t>
+            </a:r>
+            <a:r>
+              <a:rPr lang="en-US" dirty="0" smtClean="0"/>
+              <a:t>cs.washington.edu/verigames</a:t>
+            </a:r>
+          </a:p>
+        </p:txBody>
+      </p:sp>
       <p:pic>
         <p:nvPicPr>
-          <p:cNvPr id="2050" name="Picture 2"/>
+          <p:cNvPr id="7" name="Picture 3"/>
           <p:cNvPicPr>
             <a:picLocks noChangeAspect="1" noChangeArrowheads="1"/>
           </p:cNvPicPr>
           <p:nvPr/>
         </p:nvPicPr>
         <p:blipFill>
-          <a:blip r:embed="rId2">
+          <a:blip r:embed="rId2" cstate="print">
             <a:extLst>
               <a:ext uri="{28A0092B-C50C-407E-A947-70E740481C1C}">
                 <a14:useLocalDpi xmlns:a14="http://schemas.microsoft.com/office/drawing/2010/main" val="0"/>
@@ -6812,8 +7333,8 @@
         </p:blipFill>
         <p:spPr bwMode="auto">
           <a:xfrm>
-            <a:off x="76200" y="-76200"/>
-            <a:ext cx="2286000" cy="2286000"/>
+            <a:off x="76201" y="71438"/>
+            <a:ext cx="2743200" cy="2060788"/>
           </a:xfrm>
           <a:prstGeom prst="rect">
             <a:avLst/>
@@ -6853,125 +7374,11 @@
           </a:extLst>
         </p:spPr>
       </p:pic>
-      <p:sp>
-        <p:nvSpPr>
-          <p:cNvPr id="2" name="Title 1"/>
-          <p:cNvSpPr>
-            <a:spLocks noGrp="1"/>
-          </p:cNvSpPr>
-          <p:nvPr>
-            <p:ph type="title"/>
-          </p:nvPr>
-        </p:nvSpPr>
-        <p:spPr/>
-        <p:txBody>
-          <a:bodyPr>
-            <a:normAutofit/>
-          </a:bodyPr>
-          <a:lstStyle/>
-          <a:p>
-            <a:r>
-              <a:rPr lang="en-US" sz="4000" dirty="0" smtClean="0"/>
-              <a:t>Verification Games</a:t>
-            </a:r>
-            <a:endParaRPr lang="en-US" sz="4000" dirty="0"/>
-          </a:p>
-        </p:txBody>
-      </p:sp>
-      <p:sp>
-        <p:nvSpPr>
-          <p:cNvPr id="3" name="Content Placeholder 2"/>
-          <p:cNvSpPr>
-            <a:spLocks noGrp="1"/>
-          </p:cNvSpPr>
-          <p:nvPr>
-            <p:ph idx="1"/>
-          </p:nvPr>
-        </p:nvSpPr>
-        <p:spPr>
-          <a:xfrm>
-            <a:off x="457200" y="1951037"/>
-            <a:ext cx="8305800" cy="4525963"/>
-          </a:xfrm>
-        </p:spPr>
-        <p:txBody>
-          <a:bodyPr>
-            <a:normAutofit lnSpcReduction="10000"/>
-          </a:bodyPr>
-          <a:lstStyle/>
-          <a:p>
-            <a:r>
-              <a:rPr lang="en-US" dirty="0" smtClean="0"/>
-              <a:t>Gamification of program verification</a:t>
-            </a:r>
-          </a:p>
-          <a:p>
-            <a:r>
-              <a:rPr lang="en-US" dirty="0" smtClean="0"/>
-              <a:t>Game corresponds to correctness condition</a:t>
-            </a:r>
-          </a:p>
-          <a:p>
-            <a:r>
-              <a:rPr lang="en-US" dirty="0" smtClean="0"/>
-              <a:t>Game utilizes physical intuition</a:t>
-            </a:r>
-          </a:p>
-          <a:p>
-            <a:r>
-              <a:rPr lang="en-US" dirty="0" smtClean="0"/>
-              <a:t>Game is playable by anyone</a:t>
-            </a:r>
-          </a:p>
-          <a:p>
-            <a:r>
-              <a:rPr lang="en-US" dirty="0" smtClean="0"/>
-              <a:t>Game allows application of human insight</a:t>
-            </a:r>
-          </a:p>
-          <a:p>
-            <a:r>
-              <a:rPr lang="en-US" dirty="0" smtClean="0"/>
-              <a:t>Goal:  cheaper verification </a:t>
-            </a:r>
-            <a:r>
-              <a:rPr lang="en-US" dirty="0" smtClean="0">
-                <a:sym typeface="Symbol"/>
-              </a:rPr>
-              <a:t> </a:t>
-            </a:r>
-            <a:r>
-              <a:rPr lang="en-US" dirty="0" smtClean="0"/>
-              <a:t>more verification</a:t>
-            </a:r>
-          </a:p>
-          <a:p>
-            <a:endParaRPr lang="en-US" dirty="0" smtClean="0"/>
-          </a:p>
-          <a:p>
-            <a:pPr marL="0" indent="0" algn="ctr">
-              <a:buNone/>
-            </a:pPr>
-            <a:r>
-              <a:rPr lang="en-US" dirty="0" smtClean="0"/>
-              <a:t>http</a:t>
-            </a:r>
-            <a:r>
-              <a:rPr lang="en-US" dirty="0"/>
-              <a:t>://</a:t>
-            </a:r>
-            <a:r>
-              <a:rPr lang="en-US" dirty="0" smtClean="0"/>
-              <a:t>cs.washington.edu/verigames</a:t>
-            </a:r>
-          </a:p>
-        </p:txBody>
-      </p:sp>
       <p:pic>
         <p:nvPicPr>
-          <p:cNvPr id="6" name="Picture 3"/>
+          <p:cNvPr id="8" name="Content Placeholder 4"/>
           <p:cNvPicPr>
-            <a:picLocks noChangeAspect="1" noChangeArrowheads="1"/>
+            <a:picLocks noChangeAspect="1"/>
           </p:cNvPicPr>
           <p:nvPr/>
         </p:nvPicPr>
@@ -6983,52 +7390,18 @@
               </a:ext>
             </a:extLst>
           </a:blip>
-          <a:srcRect/>
           <a:stretch>
             <a:fillRect/>
           </a:stretch>
         </p:blipFill>
-        <p:spPr bwMode="auto">
+        <p:spPr>
           <a:xfrm>
-            <a:off x="6628399" y="71438"/>
-            <a:ext cx="2440730" cy="1833562"/>
+            <a:off x="6139834" y="76200"/>
+            <a:ext cx="2927966" cy="2048868"/>
           </a:xfrm>
           <a:prstGeom prst="rect">
             <a:avLst/>
           </a:prstGeom>
-          <a:noFill/>
-          <a:ln>
-            <a:noFill/>
-          </a:ln>
-          <a:effectLst/>
-          <a:extLst>
-            <a:ext uri="{909E8E84-426E-40DD-AFC4-6F175D3DCCD1}">
-              <a14:hiddenFill xmlns:a14="http://schemas.microsoft.com/office/drawing/2010/main">
-                <a:solidFill>
-                  <a:schemeClr val="accent1"/>
-                </a:solidFill>
-              </a14:hiddenFill>
-            </a:ext>
-            <a:ext uri="{91240B29-F687-4F45-9708-019B960494DF}">
-              <a14:hiddenLine xmlns:a14="http://schemas.microsoft.com/office/drawing/2010/main" w="9525">
-                <a:solidFill>
-                  <a:schemeClr val="tx1"/>
-                </a:solidFill>
-                <a:miter lim="800000"/>
-                <a:headEnd/>
-                <a:tailEnd/>
-              </a14:hiddenLine>
-            </a:ext>
-            <a:ext uri="{AF507438-7753-43E0-B8FC-AC1667EBCBE1}">
-              <a14:hiddenEffects xmlns:a14="http://schemas.microsoft.com/office/drawing/2010/main">
-                <a:effectLst>
-                  <a:outerShdw dist="35921" dir="2700000" algn="ctr" rotWithShape="0">
-                    <a:schemeClr val="bg2"/>
-                  </a:outerShdw>
-                </a:effectLst>
-              </a14:hiddenEffects>
-            </a:ext>
-          </a:extLst>
         </p:spPr>
       </p:pic>
     </p:spTree>

</xml_diff>